<commit_message>
Updated Prudential slides and alignments for mobile
</commit_message>
<xml_diff>
--- a/public_html/doc/Prudential_InsureTechApplication_PolyFintechHackathon2021_ProblemStatements.pptx
+++ b/public_html/doc/Prudential_InsureTechApplication_PolyFintechHackathon2021_ProblemStatements.pptx
@@ -6,11 +6,10 @@
   </p:sldMasterIdLst>
   <p:sldIdLst>
     <p:sldId id="256" r:id="rId2"/>
-    <p:sldId id="257" r:id="rId3"/>
-    <p:sldId id="258" r:id="rId4"/>
-    <p:sldId id="259" r:id="rId5"/>
-    <p:sldId id="260" r:id="rId6"/>
-    <p:sldId id="261" r:id="rId7"/>
+    <p:sldId id="258" r:id="rId3"/>
+    <p:sldId id="259" r:id="rId4"/>
+    <p:sldId id="260" r:id="rId5"/>
+    <p:sldId id="261" r:id="rId6"/>
   </p:sldIdLst>
   <p:sldSz cx="9144000" cy="5143500" type="screen16x9"/>
   <p:notesSz cx="9144000" cy="5143500"/>
@@ -306,7 +305,7 @@
           <a:p>
             <a:fld id="{1D8BD707-D9CF-40AE-B4C6-C98DA3205C09}" type="datetimeFigureOut">
               <a:rPr lang="en-US"/>
-              <a:t>2/27/2021</a:t>
+              <a:t>3/1/2021</a:t>
             </a:fld>
             <a:endParaRPr lang="en-US"/>
           </a:p>
@@ -529,7 +528,7 @@
           <a:p>
             <a:fld id="{1D8BD707-D9CF-40AE-B4C6-C98DA3205C09}" type="datetimeFigureOut">
               <a:rPr lang="en-US"/>
-              <a:t>2/27/2021</a:t>
+              <a:t>3/1/2021</a:t>
             </a:fld>
             <a:endParaRPr lang="en-US"/>
           </a:p>
@@ -791,7 +790,7 @@
           <a:p>
             <a:fld id="{1D8BD707-D9CF-40AE-B4C6-C98DA3205C09}" type="datetimeFigureOut">
               <a:rPr lang="en-US"/>
-              <a:t>2/27/2021</a:t>
+              <a:t>3/1/2021</a:t>
             </a:fld>
             <a:endParaRPr lang="en-US"/>
           </a:p>
@@ -987,7 +986,7 @@
           <a:p>
             <a:fld id="{1D8BD707-D9CF-40AE-B4C6-C98DA3205C09}" type="datetimeFigureOut">
               <a:rPr lang="en-US"/>
-              <a:t>2/27/2021</a:t>
+              <a:t>3/1/2021</a:t>
             </a:fld>
             <a:endParaRPr lang="en-US"/>
           </a:p>
@@ -1220,7 +1219,7 @@
           <a:p>
             <a:fld id="{1D8BD707-D9CF-40AE-B4C6-C98DA3205C09}" type="datetimeFigureOut">
               <a:rPr lang="en-US"/>
-              <a:t>2/27/2021</a:t>
+              <a:t>3/1/2021</a:t>
             </a:fld>
             <a:endParaRPr lang="en-US"/>
           </a:p>
@@ -1520,7 +1519,7 @@
           <a:p>
             <a:fld id="{1D8BD707-D9CF-40AE-B4C6-C98DA3205C09}" type="datetimeFigureOut">
               <a:rPr lang="en-US"/>
-              <a:t>2/27/2021</a:t>
+              <a:t>3/1/2021</a:t>
             </a:fld>
             <a:endParaRPr lang="en-US"/>
           </a:p>
@@ -1981,421 +1980,6 @@
       <p:sp>
         <p:nvSpPr>
           <p:cNvPr id="2" name="object 2"/>
-          <p:cNvSpPr txBox="1">
-            <a:spLocks noGrp="1"/>
-          </p:cNvSpPr>
-          <p:nvPr>
-            <p:ph type="title"/>
-          </p:nvPr>
-        </p:nvSpPr>
-        <p:spPr>
-          <a:xfrm>
-            <a:off x="1617725" y="555752"/>
-            <a:ext cx="5160010" cy="1062990"/>
-          </a:xfrm>
-          <a:prstGeom prst="rect">
-            <a:avLst/>
-          </a:prstGeom>
-        </p:spPr>
-        <p:txBody>
-          <a:bodyPr vert="horz" wrap="square" lIns="0" tIns="12700" rIns="0" bIns="0" rtlCol="0">
-            <a:spAutoFit/>
-          </a:bodyPr>
-          <a:lstStyle/>
-          <a:p>
-            <a:pPr marL="12700">
-              <a:lnSpc>
-                <a:spcPct val="100000"/>
-              </a:lnSpc>
-              <a:spcBef>
-                <a:spcPts val="100"/>
-              </a:spcBef>
-            </a:pPr>
-            <a:r>
-              <a:rPr dirty="0"/>
-              <a:t>Customer</a:t>
-            </a:r>
-          </a:p>
-          <a:p>
-            <a:pPr marL="12700" marR="5080">
-              <a:lnSpc>
-                <a:spcPct val="100000"/>
-              </a:lnSpc>
-            </a:pPr>
-            <a:r>
-              <a:rPr sz="1100" u="none" spc="-5" dirty="0"/>
-              <a:t>Prudential would </a:t>
-            </a:r>
-            <a:r>
-              <a:rPr sz="1100" u="none" spc="-10" dirty="0"/>
-              <a:t>like </a:t>
-            </a:r>
-            <a:r>
-              <a:rPr sz="1100" u="none" spc="-5" dirty="0"/>
-              <a:t>to engage existing </a:t>
-            </a:r>
-            <a:r>
-              <a:rPr sz="1100" u="none" dirty="0"/>
-              <a:t>customers </a:t>
-            </a:r>
-            <a:r>
-              <a:rPr sz="1100" u="none" spc="-5" dirty="0"/>
-              <a:t>throughout their </a:t>
-            </a:r>
-            <a:r>
-              <a:rPr sz="1100" u="none" spc="-10" dirty="0"/>
-              <a:t>life  </a:t>
-            </a:r>
-            <a:r>
-              <a:rPr sz="1100" u="none" spc="-5" dirty="0"/>
-              <a:t>events/milestones </a:t>
-            </a:r>
-            <a:r>
-              <a:rPr sz="1100" u="none" dirty="0"/>
-              <a:t>and </a:t>
-            </a:r>
-            <a:r>
-              <a:rPr sz="1100" u="none" spc="-5" dirty="0"/>
-              <a:t>recommending suitable policies </a:t>
-            </a:r>
-            <a:r>
-              <a:rPr sz="1100" u="none" dirty="0"/>
-              <a:t>to them at  </a:t>
-            </a:r>
-            <a:r>
-              <a:rPr sz="1100" u="none" spc="-5" dirty="0"/>
-              <a:t>appropriate junctures, instead </a:t>
-            </a:r>
-            <a:r>
-              <a:rPr sz="1100" u="none" dirty="0"/>
-              <a:t>of </a:t>
-            </a:r>
-            <a:r>
-              <a:rPr sz="1100" u="none" spc="-5" dirty="0"/>
-              <a:t>having </a:t>
-            </a:r>
-            <a:r>
-              <a:rPr sz="1100" u="none" dirty="0"/>
-              <a:t>a </a:t>
-            </a:r>
-            <a:r>
-              <a:rPr sz="1100" u="none" spc="-5" dirty="0"/>
-              <a:t>transactional relationship with  </a:t>
-            </a:r>
-            <a:r>
-              <a:rPr sz="1100" u="none" dirty="0"/>
-              <a:t>our</a:t>
-            </a:r>
-            <a:r>
-              <a:rPr sz="1100" u="none" spc="-15" dirty="0"/>
-              <a:t> </a:t>
-            </a:r>
-            <a:r>
-              <a:rPr sz="1100" u="none" dirty="0"/>
-              <a:t>customers.</a:t>
-            </a:r>
-            <a:endParaRPr sz="1100"/>
-          </a:p>
-        </p:txBody>
-      </p:sp>
-      <p:sp>
-        <p:nvSpPr>
-          <p:cNvPr id="3" name="object 3"/>
-          <p:cNvSpPr/>
-          <p:nvPr/>
-        </p:nvSpPr>
-        <p:spPr>
-          <a:xfrm>
-            <a:off x="391668" y="521393"/>
-            <a:ext cx="1129284" cy="1037472"/>
-          </a:xfrm>
-          <a:prstGeom prst="rect">
-            <a:avLst/>
-          </a:prstGeom>
-          <a:blipFill>
-            <a:blip r:embed="rId2" cstate="print"/>
-            <a:stretch>
-              <a:fillRect/>
-            </a:stretch>
-          </a:blipFill>
-        </p:spPr>
-        <p:txBody>
-          <a:bodyPr wrap="square" lIns="0" tIns="0" rIns="0" bIns="0" rtlCol="0"/>
-          <a:lstStyle/>
-          <a:p>
-            <a:endParaRPr/>
-          </a:p>
-        </p:txBody>
-      </p:sp>
-      <p:sp>
-        <p:nvSpPr>
-          <p:cNvPr id="4" name="object 4"/>
-          <p:cNvSpPr txBox="1"/>
-          <p:nvPr/>
-        </p:nvSpPr>
-        <p:spPr>
-          <a:xfrm>
-            <a:off x="1617725" y="2120341"/>
-            <a:ext cx="4999355" cy="551433"/>
-          </a:xfrm>
-          <a:prstGeom prst="rect">
-            <a:avLst/>
-          </a:prstGeom>
-        </p:spPr>
-        <p:txBody>
-          <a:bodyPr vert="horz" wrap="square" lIns="0" tIns="12700" rIns="0" bIns="0" rtlCol="0">
-            <a:spAutoFit/>
-          </a:bodyPr>
-          <a:lstStyle/>
-          <a:p>
-            <a:pPr marL="12700">
-              <a:lnSpc>
-                <a:spcPct val="100000"/>
-              </a:lnSpc>
-              <a:spcBef>
-                <a:spcPts val="100"/>
-              </a:spcBef>
-            </a:pPr>
-            <a:r>
-              <a:rPr sz="2400" u="heavy" spc="-5" dirty="0">
-                <a:solidFill>
-                  <a:srgbClr val="687379"/>
-                </a:solidFill>
-                <a:uFill>
-                  <a:solidFill>
-                    <a:srgbClr val="687379"/>
-                  </a:solidFill>
-                </a:uFill>
-                <a:latin typeface="Verdana"/>
-                <a:cs typeface="Verdana"/>
-              </a:rPr>
-              <a:t>D</a:t>
-            </a:r>
-            <a:r>
-              <a:rPr lang="en-SG" sz="2400" u="heavy" spc="-5" dirty="0" err="1">
-                <a:solidFill>
-                  <a:srgbClr val="687379"/>
-                </a:solidFill>
-                <a:uFill>
-                  <a:solidFill>
-                    <a:srgbClr val="687379"/>
-                  </a:solidFill>
-                </a:uFill>
-                <a:latin typeface="Verdana"/>
-                <a:cs typeface="Verdana"/>
-              </a:rPr>
-              <a:t>igital</a:t>
-            </a:r>
-            <a:r>
-              <a:rPr lang="en-SG" sz="2400" u="heavy" spc="-5" dirty="0">
-                <a:solidFill>
-                  <a:srgbClr val="687379"/>
-                </a:solidFill>
-                <a:uFill>
-                  <a:solidFill>
-                    <a:srgbClr val="687379"/>
-                  </a:solidFill>
-                </a:uFill>
-                <a:latin typeface="Verdana"/>
-                <a:cs typeface="Verdana"/>
-              </a:rPr>
-              <a:t> Marketing</a:t>
-            </a:r>
-            <a:endParaRPr sz="2400" dirty="0">
-              <a:latin typeface="Verdana"/>
-              <a:cs typeface="Verdana"/>
-            </a:endParaRPr>
-          </a:p>
-          <a:p>
-            <a:pPr marL="12700" marR="5080">
-              <a:lnSpc>
-                <a:spcPct val="100000"/>
-              </a:lnSpc>
-              <a:spcBef>
-                <a:spcPts val="5"/>
-              </a:spcBef>
-            </a:pPr>
-            <a:r>
-              <a:rPr lang="en-SG" sz="1100" i="1" spc="-5" dirty="0">
-                <a:solidFill>
-                  <a:srgbClr val="687379"/>
-                </a:solidFill>
-                <a:latin typeface="Verdana"/>
-                <a:cs typeface="Verdana"/>
-              </a:rPr>
-              <a:t>&lt;Need a description here…&gt;</a:t>
-            </a:r>
-            <a:endParaRPr sz="1100" i="1" dirty="0">
-              <a:latin typeface="Verdana"/>
-              <a:cs typeface="Verdana"/>
-            </a:endParaRPr>
-          </a:p>
-        </p:txBody>
-      </p:sp>
-      <p:sp>
-        <p:nvSpPr>
-          <p:cNvPr id="8" name="object 8"/>
-          <p:cNvSpPr txBox="1">
-            <a:spLocks noGrp="1"/>
-          </p:cNvSpPr>
-          <p:nvPr>
-            <p:ph type="ftr" sz="quarter" idx="5"/>
-          </p:nvPr>
-        </p:nvSpPr>
-        <p:spPr>
-          <a:prstGeom prst="rect">
-            <a:avLst/>
-          </a:prstGeom>
-        </p:spPr>
-        <p:txBody>
-          <a:bodyPr vert="horz" wrap="square" lIns="0" tIns="12700" rIns="0" bIns="0" rtlCol="0">
-            <a:spAutoFit/>
-          </a:bodyPr>
-          <a:lstStyle/>
-          <a:p>
-            <a:pPr marL="12700">
-              <a:lnSpc>
-                <a:spcPct val="100000"/>
-              </a:lnSpc>
-              <a:spcBef>
-                <a:spcPts val="100"/>
-              </a:spcBef>
-            </a:pPr>
-            <a:r>
-              <a:rPr dirty="0"/>
-              <a:t>C</a:t>
-            </a:r>
-            <a:r>
-              <a:rPr spc="-10" dirty="0"/>
-              <a:t>o</a:t>
-            </a:r>
-            <a:r>
-              <a:rPr spc="-5" dirty="0"/>
-              <a:t>n</a:t>
-            </a:r>
-            <a:r>
-              <a:rPr spc="-10" dirty="0"/>
-              <a:t>f</a:t>
-            </a:r>
-            <a:r>
-              <a:rPr spc="-20" dirty="0"/>
-              <a:t>i</a:t>
-            </a:r>
-            <a:r>
-              <a:rPr spc="-5" dirty="0"/>
-              <a:t>dent</a:t>
-            </a:r>
-            <a:r>
-              <a:rPr spc="-15" dirty="0"/>
-              <a:t>i</a:t>
-            </a:r>
-            <a:r>
-              <a:rPr spc="-5" dirty="0"/>
-              <a:t>al</a:t>
-            </a:r>
-          </a:p>
-        </p:txBody>
-      </p:sp>
-      <p:sp>
-        <p:nvSpPr>
-          <p:cNvPr id="9" name="object 9"/>
-          <p:cNvSpPr txBox="1">
-            <a:spLocks noGrp="1"/>
-          </p:cNvSpPr>
-          <p:nvPr>
-            <p:ph type="sldNum" sz="quarter" idx="7"/>
-          </p:nvPr>
-        </p:nvSpPr>
-        <p:spPr>
-          <a:prstGeom prst="rect">
-            <a:avLst/>
-          </a:prstGeom>
-        </p:spPr>
-        <p:txBody>
-          <a:bodyPr vert="horz" wrap="square" lIns="0" tIns="12700" rIns="0" bIns="0" rtlCol="0">
-            <a:spAutoFit/>
-          </a:bodyPr>
-          <a:lstStyle/>
-          <a:p>
-            <a:pPr marL="38100">
-              <a:lnSpc>
-                <a:spcPct val="100000"/>
-              </a:lnSpc>
-              <a:spcBef>
-                <a:spcPts val="100"/>
-              </a:spcBef>
-            </a:pPr>
-            <a:r>
-              <a:rPr spc="-5" dirty="0"/>
-              <a:t>1</a:t>
-            </a:r>
-          </a:p>
-        </p:txBody>
-      </p:sp>
-      <p:pic>
-        <p:nvPicPr>
-          <p:cNvPr id="11" name="Picture 10" descr="Icon&#10;&#10;Description automatically generated">
-            <a:extLst>
-              <a:ext uri="{FF2B5EF4-FFF2-40B4-BE49-F238E27FC236}">
-                <a16:creationId xmlns:a16="http://schemas.microsoft.com/office/drawing/2014/main" id="{04A9A6B3-0882-44F8-A885-ECCC427E72A3}"/>
-              </a:ext>
-            </a:extLst>
-          </p:cNvPr>
-          <p:cNvPicPr>
-            <a:picLocks noChangeAspect="1"/>
-          </p:cNvPicPr>
-          <p:nvPr/>
-        </p:nvPicPr>
-        <p:blipFill>
-          <a:blip r:embed="rId3" cstate="print">
-            <a:extLst>
-              <a:ext uri="{28A0092B-C50C-407E-A947-70E740481C1C}">
-                <a14:useLocalDpi xmlns:a14="http://schemas.microsoft.com/office/drawing/2010/main" val="0"/>
-              </a:ext>
-            </a:extLst>
-          </a:blip>
-          <a:stretch>
-            <a:fillRect/>
-          </a:stretch>
-        </p:blipFill>
-        <p:spPr>
-          <a:xfrm>
-            <a:off x="391668" y="1863691"/>
-            <a:ext cx="1152000" cy="1152000"/>
-          </a:xfrm>
-          <a:prstGeom prst="rect">
-            <a:avLst/>
-          </a:prstGeom>
-        </p:spPr>
-      </p:pic>
-    </p:spTree>
-  </p:cSld>
-  <p:clrMapOvr>
-    <a:masterClrMapping/>
-  </p:clrMapOvr>
-</p:sld>
-</file>
-
-<file path=ppt/slides/slide3.xml><?xml version="1.0" encoding="utf-8"?>
-<p:sld xmlns:a="http://schemas.openxmlformats.org/drawingml/2006/main" xmlns:r="http://schemas.openxmlformats.org/officeDocument/2006/relationships" xmlns:p="http://schemas.openxmlformats.org/presentationml/2006/main">
-  <p:cSld>
-    <p:spTree>
-      <p:nvGrpSpPr>
-        <p:cNvPr id="1" name=""/>
-        <p:cNvGrpSpPr/>
-        <p:nvPr/>
-      </p:nvGrpSpPr>
-      <p:grpSpPr>
-        <a:xfrm>
-          <a:off x="0" y="0"/>
-          <a:ext cx="0" cy="0"/>
-          <a:chOff x="0" y="0"/>
-          <a:chExt cx="0" cy="0"/>
-        </a:xfrm>
-      </p:grpSpPr>
-      <p:sp>
-        <p:nvSpPr>
-          <p:cNvPr id="2" name="object 2"/>
           <p:cNvSpPr txBox="1"/>
           <p:nvPr/>
         </p:nvSpPr>
@@ -2758,7 +2342,7 @@
 </p:sld>
 </file>
 
-<file path=ppt/slides/slide4.xml><?xml version="1.0" encoding="utf-8"?>
+<file path=ppt/slides/slide3.xml><?xml version="1.0" encoding="utf-8"?>
 <p:sld xmlns:a="http://schemas.openxmlformats.org/drawingml/2006/main" xmlns:r="http://schemas.openxmlformats.org/officeDocument/2006/relationships" xmlns:p="http://schemas.openxmlformats.org/presentationml/2006/main">
   <p:cSld>
     <p:spTree>
@@ -3140,7 +2724,7 @@
 </p:sld>
 </file>
 
-<file path=ppt/slides/slide5.xml><?xml version="1.0" encoding="utf-8"?>
+<file path=ppt/slides/slide4.xml><?xml version="1.0" encoding="utf-8"?>
 <p:sld xmlns:a="http://schemas.openxmlformats.org/drawingml/2006/main" xmlns:r="http://schemas.openxmlformats.org/officeDocument/2006/relationships" xmlns:p="http://schemas.openxmlformats.org/presentationml/2006/main">
   <p:cSld>
     <p:spTree>
@@ -3487,7 +3071,7 @@
 </p:sld>
 </file>
 
-<file path=ppt/slides/slide6.xml><?xml version="1.0" encoding="utf-8"?>
+<file path=ppt/slides/slide5.xml><?xml version="1.0" encoding="utf-8"?>
 <p:sld xmlns:a="http://schemas.openxmlformats.org/drawingml/2006/main" xmlns:r="http://schemas.openxmlformats.org/officeDocument/2006/relationships" xmlns:p="http://schemas.openxmlformats.org/presentationml/2006/main">
   <p:cSld>
     <p:spTree>

</xml_diff>

<commit_message>
Updated Prudential Problem Statements.
</commit_message>
<xml_diff>
--- a/public_html/doc/Prudential_InsureTechApplication_PolyFintechHackathon2021_ProblemStatements.pptx
+++ b/public_html/doc/Prudential_InsureTechApplication_PolyFintechHackathon2021_ProblemStatements.pptx
@@ -10,6 +10,10 @@
     <p:sldId id="259" r:id="rId4"/>
     <p:sldId id="260" r:id="rId5"/>
     <p:sldId id="261" r:id="rId6"/>
+    <p:sldId id="262" r:id="rId7"/>
+    <p:sldId id="263" r:id="rId8"/>
+    <p:sldId id="264" r:id="rId9"/>
+    <p:sldId id="265" r:id="rId10"/>
   </p:sldIdLst>
   <p:sldSz cx="9144000" cy="5143500" type="screen16x9"/>
   <p:notesSz cx="9144000" cy="5143500"/>
@@ -305,7 +309,7 @@
           <a:p>
             <a:fld id="{1D8BD707-D9CF-40AE-B4C6-C98DA3205C09}" type="datetimeFigureOut">
               <a:rPr lang="en-US"/>
-              <a:t>3/1/2021</a:t>
+              <a:t>3/12/2021</a:t>
             </a:fld>
             <a:endParaRPr lang="en-US"/>
           </a:p>
@@ -528,7 +532,7 @@
           <a:p>
             <a:fld id="{1D8BD707-D9CF-40AE-B4C6-C98DA3205C09}" type="datetimeFigureOut">
               <a:rPr lang="en-US"/>
-              <a:t>3/1/2021</a:t>
+              <a:t>3/12/2021</a:t>
             </a:fld>
             <a:endParaRPr lang="en-US"/>
           </a:p>
@@ -790,7 +794,7 @@
           <a:p>
             <a:fld id="{1D8BD707-D9CF-40AE-B4C6-C98DA3205C09}" type="datetimeFigureOut">
               <a:rPr lang="en-US"/>
-              <a:t>3/1/2021</a:t>
+              <a:t>3/12/2021</a:t>
             </a:fld>
             <a:endParaRPr lang="en-US"/>
           </a:p>
@@ -986,7 +990,7 @@
           <a:p>
             <a:fld id="{1D8BD707-D9CF-40AE-B4C6-C98DA3205C09}" type="datetimeFigureOut">
               <a:rPr lang="en-US"/>
-              <a:t>3/1/2021</a:t>
+              <a:t>3/12/2021</a:t>
             </a:fld>
             <a:endParaRPr lang="en-US"/>
           </a:p>
@@ -1219,7 +1223,7 @@
           <a:p>
             <a:fld id="{1D8BD707-D9CF-40AE-B4C6-C98DA3205C09}" type="datetimeFigureOut">
               <a:rPr lang="en-US"/>
-              <a:t>3/1/2021</a:t>
+              <a:t>3/12/2021</a:t>
             </a:fld>
             <a:endParaRPr lang="en-US"/>
           </a:p>
@@ -1519,7 +1523,7 @@
           <a:p>
             <a:fld id="{1D8BD707-D9CF-40AE-B4C6-C98DA3205C09}" type="datetimeFigureOut">
               <a:rPr lang="en-US"/>
-              <a:t>3/1/2021</a:t>
+              <a:t>3/12/2021</a:t>
             </a:fld>
             <a:endParaRPr lang="en-US"/>
           </a:p>
@@ -2170,7 +2174,7 @@
         <p:spPr>
           <a:xfrm>
             <a:off x="1778000" y="560070"/>
-            <a:ext cx="1504315" cy="391160"/>
+            <a:ext cx="3784600" cy="382156"/>
           </a:xfrm>
           <a:prstGeom prst="rect">
             <a:avLst/>
@@ -2202,6 +2206,11 @@
               <a:rPr dirty="0"/>
               <a:t>stomer</a:t>
             </a:r>
+            <a:r>
+              <a:rPr lang="en-SG" dirty="0"/>
+              <a:t> Engagement</a:t>
+            </a:r>
+            <a:endParaRPr dirty="0"/>
           </a:p>
         </p:txBody>
       </p:sp>
@@ -2368,7 +2377,7 @@
         <p:spPr>
           <a:xfrm>
             <a:off x="682244" y="1105003"/>
-            <a:ext cx="7615555" cy="1644040"/>
+            <a:ext cx="7615555" cy="1674817"/>
           </a:xfrm>
           <a:prstGeom prst="rect">
             <a:avLst/>
@@ -2457,18 +2466,14 @@
               </a:rPr>
               <a:t>How might we be the trusted partner for Gen Z as they make big and small financial decisions in their daily life?</a:t>
             </a:r>
-            <a:endParaRPr sz="1200" dirty="0">
-              <a:latin typeface="Verdana"/>
-              <a:cs typeface="Verdana"/>
-            </a:endParaRPr>
-          </a:p>
-          <a:p>
-            <a:pPr>
-              <a:lnSpc>
-                <a:spcPct val="100000"/>
-              </a:lnSpc>
-              <a:spcBef>
-                <a:spcPts val="40"/>
+          </a:p>
+          <a:p>
+            <a:pPr marL="12700" marR="270510">
+              <a:lnSpc>
+                <a:spcPts val="1200"/>
+              </a:lnSpc>
+              <a:spcBef>
+                <a:spcPts val="605"/>
               </a:spcBef>
             </a:pPr>
             <a:endParaRPr sz="1300" dirty="0">
@@ -2750,7 +2755,7 @@
         <p:spPr>
           <a:xfrm>
             <a:off x="682244" y="1105003"/>
-            <a:ext cx="7615555" cy="2167260"/>
+            <a:ext cx="7615555" cy="2752035"/>
           </a:xfrm>
           <a:prstGeom prst="rect">
             <a:avLst/>
@@ -2839,18 +2844,14 @@
               </a:rPr>
               <a:t>How might we as an insurance business build an ESG (Environment, Social and Governance) programme that will energize our stakeholders to co-create a better world for our next generation?</a:t>
             </a:r>
-            <a:endParaRPr sz="1200" dirty="0">
-              <a:latin typeface="Verdana"/>
-              <a:cs typeface="Verdana"/>
-            </a:endParaRPr>
-          </a:p>
-          <a:p>
-            <a:pPr>
-              <a:lnSpc>
-                <a:spcPct val="100000"/>
-              </a:lnSpc>
-              <a:spcBef>
-                <a:spcPts val="40"/>
+          </a:p>
+          <a:p>
+            <a:pPr marL="12700" marR="270510">
+              <a:lnSpc>
+                <a:spcPts val="1200"/>
+              </a:lnSpc>
+              <a:spcBef>
+                <a:spcPts val="605"/>
               </a:spcBef>
             </a:pPr>
             <a:endParaRPr sz="1300" dirty="0">
@@ -2873,6 +2874,54 @@
                 <a:cs typeface="Verdana"/>
               </a:rPr>
               <a:t>Sustainability has become increasingly more important in our lives (insert definition link). At Prudential, we want to innovate to enable sustainable living for everyone through the solutions we offer (insert 2019/20 sustainability report), the investments we make and the lives we touch today, for future generations. This ESG vision supports our purpose of Innovating to help everyone live well. We look forward to hearing from you that how might we improve our ESG initiatives and engage more people to create a better future.</a:t>
+            </a:r>
+          </a:p>
+          <a:p>
+            <a:pPr marL="12700" marR="5080">
+              <a:lnSpc>
+                <a:spcPct val="100000"/>
+              </a:lnSpc>
+            </a:pPr>
+            <a:endParaRPr lang="en-SG" sz="1200" spc="-10" dirty="0">
+              <a:solidFill>
+                <a:srgbClr val="687379"/>
+              </a:solidFill>
+              <a:latin typeface="Verdana"/>
+              <a:cs typeface="Verdana"/>
+            </a:endParaRPr>
+          </a:p>
+          <a:p>
+            <a:pPr marL="12700" marR="5080">
+              <a:lnSpc>
+                <a:spcPct val="100000"/>
+              </a:lnSpc>
+            </a:pPr>
+            <a:r>
+              <a:rPr lang="en-SG" sz="1200" spc="-10" dirty="0">
+                <a:solidFill>
+                  <a:srgbClr val="687379"/>
+                </a:solidFill>
+                <a:latin typeface="Verdana"/>
+                <a:cs typeface="Verdana"/>
+              </a:rPr>
+              <a:t>Prudential's Sustainability Report 2019:</a:t>
+            </a:r>
+          </a:p>
+          <a:p>
+            <a:pPr marL="12700" marR="5080">
+              <a:lnSpc>
+                <a:spcPct val="100000"/>
+              </a:lnSpc>
+            </a:pPr>
+            <a:r>
+              <a:rPr lang="en-SG" sz="1200" spc="-10" dirty="0">
+                <a:solidFill>
+                  <a:srgbClr val="687379"/>
+                </a:solidFill>
+                <a:latin typeface="Verdana"/>
+                <a:cs typeface="Verdana"/>
+              </a:rPr>
+              <a:t>https://www.prudential.com.sg/services/useful-links/sustainability-report</a:t>
             </a:r>
             <a:endParaRPr sz="1200" dirty="0">
               <a:latin typeface="Verdana"/>
@@ -3097,7 +3146,7 @@
         <p:spPr>
           <a:xfrm>
             <a:off x="682244" y="1105003"/>
-            <a:ext cx="7615555" cy="1459374"/>
+            <a:ext cx="7615555" cy="1490152"/>
           </a:xfrm>
           <a:prstGeom prst="rect">
             <a:avLst/>
@@ -3186,18 +3235,14 @@
               </a:rPr>
               <a:t>How might we provide Gen Z with content and tools on financial literacy that they will be excited to use and share with their friends about?</a:t>
             </a:r>
-            <a:endParaRPr sz="1200" dirty="0">
-              <a:latin typeface="Verdana"/>
-              <a:cs typeface="Verdana"/>
-            </a:endParaRPr>
-          </a:p>
-          <a:p>
-            <a:pPr>
-              <a:lnSpc>
-                <a:spcPct val="100000"/>
-              </a:lnSpc>
-              <a:spcBef>
-                <a:spcPts val="40"/>
+          </a:p>
+          <a:p>
+            <a:pPr marL="12700" marR="270510">
+              <a:lnSpc>
+                <a:spcPts val="1200"/>
+              </a:lnSpc>
+              <a:spcBef>
+                <a:spcPts val="605"/>
               </a:spcBef>
             </a:pPr>
             <a:endParaRPr sz="1300" dirty="0">
@@ -3409,6 +3454,1666 @@
     <p:extLst>
       <p:ext uri="{BB962C8B-B14F-4D97-AF65-F5344CB8AC3E}">
         <p14:creationId xmlns:p14="http://schemas.microsoft.com/office/powerpoint/2010/main" val="228322070"/>
+      </p:ext>
+    </p:extLst>
+  </p:cSld>
+  <p:clrMapOvr>
+    <a:masterClrMapping/>
+  </p:clrMapOvr>
+</p:sld>
+</file>
+
+<file path=ppt/slides/slide6.xml><?xml version="1.0" encoding="utf-8"?>
+<p:sld xmlns:a="http://schemas.openxmlformats.org/drawingml/2006/main" xmlns:r="http://schemas.openxmlformats.org/officeDocument/2006/relationships" xmlns:p="http://schemas.openxmlformats.org/presentationml/2006/main">
+  <p:cSld>
+    <p:spTree>
+      <p:nvGrpSpPr>
+        <p:cNvPr id="1" name=""/>
+        <p:cNvGrpSpPr/>
+        <p:nvPr/>
+      </p:nvGrpSpPr>
+      <p:grpSpPr>
+        <a:xfrm>
+          <a:off x="0" y="0"/>
+          <a:ext cx="0" cy="0"/>
+          <a:chOff x="0" y="0"/>
+          <a:chExt cx="0" cy="0"/>
+        </a:xfrm>
+      </p:grpSpPr>
+      <p:sp>
+        <p:nvSpPr>
+          <p:cNvPr id="2" name="object 2"/>
+          <p:cNvSpPr txBox="1"/>
+          <p:nvPr/>
+        </p:nvSpPr>
+        <p:spPr>
+          <a:xfrm>
+            <a:off x="682244" y="1105003"/>
+            <a:ext cx="7615555" cy="2228815"/>
+          </a:xfrm>
+          <a:prstGeom prst="rect">
+            <a:avLst/>
+          </a:prstGeom>
+        </p:spPr>
+        <p:txBody>
+          <a:bodyPr vert="horz" wrap="square" lIns="0" tIns="73660" rIns="0" bIns="0" rtlCol="0">
+            <a:spAutoFit/>
+          </a:bodyPr>
+          <a:lstStyle/>
+          <a:p>
+            <a:pPr marL="12700">
+              <a:lnSpc>
+                <a:spcPct val="100000"/>
+              </a:lnSpc>
+              <a:spcBef>
+                <a:spcPts val="580"/>
+              </a:spcBef>
+            </a:pPr>
+            <a:r>
+              <a:rPr sz="1600" u="sng" spc="-5" dirty="0">
+                <a:solidFill>
+                  <a:srgbClr val="EC1B2D"/>
+                </a:solidFill>
+                <a:uFill>
+                  <a:solidFill>
+                    <a:srgbClr val="EC1B2D"/>
+                  </a:solidFill>
+                </a:uFill>
+                <a:latin typeface="Verdana"/>
+                <a:cs typeface="Verdana"/>
+              </a:rPr>
+              <a:t>Problem</a:t>
+            </a:r>
+            <a:r>
+              <a:rPr sz="1600" u="sng" spc="25" dirty="0">
+                <a:solidFill>
+                  <a:srgbClr val="EC1B2D"/>
+                </a:solidFill>
+                <a:uFill>
+                  <a:solidFill>
+                    <a:srgbClr val="EC1B2D"/>
+                  </a:solidFill>
+                </a:uFill>
+                <a:latin typeface="Verdana"/>
+                <a:cs typeface="Verdana"/>
+              </a:rPr>
+              <a:t> </a:t>
+            </a:r>
+            <a:r>
+              <a:rPr sz="1600" u="sng" spc="-10" dirty="0">
+                <a:solidFill>
+                  <a:srgbClr val="EC1B2D"/>
+                </a:solidFill>
+                <a:uFill>
+                  <a:solidFill>
+                    <a:srgbClr val="EC1B2D"/>
+                  </a:solidFill>
+                </a:uFill>
+                <a:latin typeface="Verdana"/>
+                <a:cs typeface="Verdana"/>
+              </a:rPr>
+              <a:t>Statement</a:t>
+            </a:r>
+            <a:endParaRPr sz="1600" dirty="0">
+              <a:latin typeface="Verdana"/>
+              <a:cs typeface="Verdana"/>
+            </a:endParaRPr>
+          </a:p>
+          <a:p>
+            <a:pPr marL="12700" marR="270510">
+              <a:lnSpc>
+                <a:spcPts val="1200"/>
+              </a:lnSpc>
+              <a:spcBef>
+                <a:spcPts val="605"/>
+              </a:spcBef>
+            </a:pPr>
+            <a:r>
+              <a:rPr lang="en-SG" sz="1200" spc="-5" dirty="0">
+                <a:solidFill>
+                  <a:srgbClr val="EC1B2D"/>
+                </a:solidFill>
+                <a:latin typeface="Verdana"/>
+                <a:cs typeface="Verdana"/>
+              </a:rPr>
+              <a:t>How might we do social listening in a more effective way and use this to improve proactively engage with our community and customers?</a:t>
+            </a:r>
+          </a:p>
+          <a:p>
+            <a:pPr marL="12700" marR="270510">
+              <a:lnSpc>
+                <a:spcPts val="1200"/>
+              </a:lnSpc>
+              <a:spcBef>
+                <a:spcPts val="605"/>
+              </a:spcBef>
+            </a:pPr>
+            <a:endParaRPr sz="1300" dirty="0">
+              <a:latin typeface="Verdana"/>
+              <a:cs typeface="Verdana"/>
+            </a:endParaRPr>
+          </a:p>
+          <a:p>
+            <a:pPr marL="12700" marR="5080">
+              <a:lnSpc>
+                <a:spcPct val="100000"/>
+              </a:lnSpc>
+            </a:pPr>
+            <a:r>
+              <a:rPr lang="en-SG" sz="1200" spc="-10" dirty="0">
+                <a:solidFill>
+                  <a:srgbClr val="687379"/>
+                </a:solidFill>
+                <a:latin typeface="Verdana"/>
+                <a:cs typeface="Verdana"/>
+              </a:rPr>
+              <a:t>We are exploring how we might design a cost-effective social listening framework and strategy for various Prudential markets, starting from basics like pulling out keywords and topics people are looking at, and understanding sentiment through emojis to working out optimized timing for social posting and driving higher engagement in Pulse communities.  The best solutions will also work out a sustainable way to reach offline communities using online channels.</a:t>
+            </a:r>
+          </a:p>
+          <a:p>
+            <a:pPr marL="12700" marR="5080">
+              <a:lnSpc>
+                <a:spcPct val="100000"/>
+              </a:lnSpc>
+            </a:pPr>
+            <a:endParaRPr lang="en-SG" sz="1200" spc="-10" dirty="0">
+              <a:solidFill>
+                <a:srgbClr val="687379"/>
+              </a:solidFill>
+              <a:latin typeface="Verdana"/>
+              <a:cs typeface="Verdana"/>
+            </a:endParaRPr>
+          </a:p>
+          <a:p>
+            <a:pPr marL="12700" marR="5080">
+              <a:lnSpc>
+                <a:spcPct val="100000"/>
+              </a:lnSpc>
+            </a:pPr>
+            <a:r>
+              <a:rPr lang="en-SG" sz="1200" spc="-10" dirty="0">
+                <a:solidFill>
+                  <a:srgbClr val="687379"/>
+                </a:solidFill>
+                <a:latin typeface="Verdana"/>
+                <a:cs typeface="Verdana"/>
+              </a:rPr>
+              <a:t>You can find the Pulse by Prudential app in both the Apple and Google Play app store.</a:t>
+            </a:r>
+            <a:endParaRPr sz="1200" dirty="0">
+              <a:latin typeface="Verdana"/>
+              <a:cs typeface="Verdana"/>
+            </a:endParaRPr>
+          </a:p>
+        </p:txBody>
+      </p:sp>
+      <p:sp>
+        <p:nvSpPr>
+          <p:cNvPr id="3" name="object 3"/>
+          <p:cNvSpPr txBox="1">
+            <a:spLocks noGrp="1"/>
+          </p:cNvSpPr>
+          <p:nvPr>
+            <p:ph type="title"/>
+          </p:nvPr>
+        </p:nvSpPr>
+        <p:spPr>
+          <a:xfrm>
+            <a:off x="1778000" y="560070"/>
+            <a:ext cx="2794000" cy="382156"/>
+          </a:xfrm>
+          <a:prstGeom prst="rect">
+            <a:avLst/>
+          </a:prstGeom>
+        </p:spPr>
+        <p:txBody>
+          <a:bodyPr vert="horz" wrap="square" lIns="0" tIns="12700" rIns="0" bIns="0" rtlCol="0">
+            <a:spAutoFit/>
+          </a:bodyPr>
+          <a:lstStyle/>
+          <a:p>
+            <a:pPr marL="12700">
+              <a:lnSpc>
+                <a:spcPct val="100000"/>
+              </a:lnSpc>
+              <a:spcBef>
+                <a:spcPts val="100"/>
+              </a:spcBef>
+            </a:pPr>
+            <a:r>
+              <a:rPr lang="en-SG" spc="-5" dirty="0"/>
+              <a:t>Social Listening</a:t>
+            </a:r>
+            <a:endParaRPr dirty="0"/>
+          </a:p>
+        </p:txBody>
+      </p:sp>
+      <p:sp>
+        <p:nvSpPr>
+          <p:cNvPr id="5" name="object 5"/>
+          <p:cNvSpPr txBox="1">
+            <a:spLocks noGrp="1"/>
+          </p:cNvSpPr>
+          <p:nvPr>
+            <p:ph type="ftr" sz="quarter" idx="5"/>
+          </p:nvPr>
+        </p:nvSpPr>
+        <p:spPr>
+          <a:prstGeom prst="rect">
+            <a:avLst/>
+          </a:prstGeom>
+        </p:spPr>
+        <p:txBody>
+          <a:bodyPr vert="horz" wrap="square" lIns="0" tIns="12700" rIns="0" bIns="0" rtlCol="0">
+            <a:spAutoFit/>
+          </a:bodyPr>
+          <a:lstStyle/>
+          <a:p>
+            <a:pPr marL="12700">
+              <a:lnSpc>
+                <a:spcPct val="100000"/>
+              </a:lnSpc>
+              <a:spcBef>
+                <a:spcPts val="100"/>
+              </a:spcBef>
+            </a:pPr>
+            <a:r>
+              <a:rPr dirty="0"/>
+              <a:t>C</a:t>
+            </a:r>
+            <a:r>
+              <a:rPr spc="-10" dirty="0"/>
+              <a:t>o</a:t>
+            </a:r>
+            <a:r>
+              <a:rPr spc="-5" dirty="0"/>
+              <a:t>n</a:t>
+            </a:r>
+            <a:r>
+              <a:rPr spc="-10" dirty="0"/>
+              <a:t>f</a:t>
+            </a:r>
+            <a:r>
+              <a:rPr spc="-20" dirty="0"/>
+              <a:t>i</a:t>
+            </a:r>
+            <a:r>
+              <a:rPr spc="-5" dirty="0"/>
+              <a:t>dent</a:t>
+            </a:r>
+            <a:r>
+              <a:rPr spc="-15" dirty="0"/>
+              <a:t>i</a:t>
+            </a:r>
+            <a:r>
+              <a:rPr spc="-5" dirty="0"/>
+              <a:t>al</a:t>
+            </a:r>
+          </a:p>
+        </p:txBody>
+      </p:sp>
+      <p:sp>
+        <p:nvSpPr>
+          <p:cNvPr id="6" name="object 6"/>
+          <p:cNvSpPr txBox="1">
+            <a:spLocks noGrp="1"/>
+          </p:cNvSpPr>
+          <p:nvPr>
+            <p:ph type="sldNum" sz="quarter" idx="7"/>
+          </p:nvPr>
+        </p:nvSpPr>
+        <p:spPr>
+          <a:prstGeom prst="rect">
+            <a:avLst/>
+          </a:prstGeom>
+        </p:spPr>
+        <p:txBody>
+          <a:bodyPr vert="horz" wrap="square" lIns="0" tIns="12700" rIns="0" bIns="0" rtlCol="0">
+            <a:spAutoFit/>
+          </a:bodyPr>
+          <a:lstStyle/>
+          <a:p>
+            <a:pPr marL="38100">
+              <a:lnSpc>
+                <a:spcPct val="100000"/>
+              </a:lnSpc>
+              <a:spcBef>
+                <a:spcPts val="100"/>
+              </a:spcBef>
+            </a:pPr>
+            <a:r>
+              <a:rPr spc="-5" dirty="0"/>
+              <a:t>3</a:t>
+            </a:r>
+          </a:p>
+        </p:txBody>
+      </p:sp>
+      <p:pic>
+        <p:nvPicPr>
+          <p:cNvPr id="7" name="Picture 6" descr="Icon&#10;&#10;Description automatically generated">
+            <a:extLst>
+              <a:ext uri="{FF2B5EF4-FFF2-40B4-BE49-F238E27FC236}">
+                <a16:creationId xmlns:a16="http://schemas.microsoft.com/office/drawing/2014/main" id="{D6970A4D-ECB8-4702-A531-F17BA55F1095}"/>
+              </a:ext>
+            </a:extLst>
+          </p:cNvPr>
+          <p:cNvPicPr>
+            <a:picLocks noChangeAspect="1"/>
+          </p:cNvPicPr>
+          <p:nvPr/>
+        </p:nvPicPr>
+        <p:blipFill>
+          <a:blip r:embed="rId2" cstate="print">
+            <a:extLst>
+              <a:ext uri="{28A0092B-C50C-407E-A947-70E740481C1C}">
+                <a14:useLocalDpi xmlns:a14="http://schemas.microsoft.com/office/drawing/2010/main" val="0"/>
+              </a:ext>
+            </a:extLst>
+          </a:blip>
+          <a:stretch>
+            <a:fillRect/>
+          </a:stretch>
+        </p:blipFill>
+        <p:spPr>
+          <a:xfrm>
+            <a:off x="682244" y="330270"/>
+            <a:ext cx="841756" cy="841756"/>
+          </a:xfrm>
+          <a:prstGeom prst="rect">
+            <a:avLst/>
+          </a:prstGeom>
+        </p:spPr>
+      </p:pic>
+    </p:spTree>
+    <p:extLst>
+      <p:ext uri="{BB962C8B-B14F-4D97-AF65-F5344CB8AC3E}">
+        <p14:creationId xmlns:p14="http://schemas.microsoft.com/office/powerpoint/2010/main" val="1140918307"/>
+      </p:ext>
+    </p:extLst>
+  </p:cSld>
+  <p:clrMapOvr>
+    <a:masterClrMapping/>
+  </p:clrMapOvr>
+</p:sld>
+</file>
+
+<file path=ppt/slides/slide7.xml><?xml version="1.0" encoding="utf-8"?>
+<p:sld xmlns:a="http://schemas.openxmlformats.org/drawingml/2006/main" xmlns:r="http://schemas.openxmlformats.org/officeDocument/2006/relationships" xmlns:p="http://schemas.openxmlformats.org/presentationml/2006/main">
+  <p:cSld>
+    <p:spTree>
+      <p:nvGrpSpPr>
+        <p:cNvPr id="1" name=""/>
+        <p:cNvGrpSpPr/>
+        <p:nvPr/>
+      </p:nvGrpSpPr>
+      <p:grpSpPr>
+        <a:xfrm>
+          <a:off x="0" y="0"/>
+          <a:ext cx="0" cy="0"/>
+          <a:chOff x="0" y="0"/>
+          <a:chExt cx="0" cy="0"/>
+        </a:xfrm>
+      </p:grpSpPr>
+      <p:sp>
+        <p:nvSpPr>
+          <p:cNvPr id="2" name="object 2"/>
+          <p:cNvSpPr txBox="1"/>
+          <p:nvPr/>
+        </p:nvSpPr>
+        <p:spPr>
+          <a:xfrm>
+            <a:off x="682244" y="1105003"/>
+            <a:ext cx="7615555" cy="2598147"/>
+          </a:xfrm>
+          <a:prstGeom prst="rect">
+            <a:avLst/>
+          </a:prstGeom>
+        </p:spPr>
+        <p:txBody>
+          <a:bodyPr vert="horz" wrap="square" lIns="0" tIns="73660" rIns="0" bIns="0" rtlCol="0">
+            <a:spAutoFit/>
+          </a:bodyPr>
+          <a:lstStyle/>
+          <a:p>
+            <a:pPr marL="12700">
+              <a:lnSpc>
+                <a:spcPct val="100000"/>
+              </a:lnSpc>
+              <a:spcBef>
+                <a:spcPts val="580"/>
+              </a:spcBef>
+            </a:pPr>
+            <a:r>
+              <a:rPr sz="1600" u="sng" spc="-5" dirty="0">
+                <a:solidFill>
+                  <a:srgbClr val="EC1B2D"/>
+                </a:solidFill>
+                <a:uFill>
+                  <a:solidFill>
+                    <a:srgbClr val="EC1B2D"/>
+                  </a:solidFill>
+                </a:uFill>
+                <a:latin typeface="Verdana"/>
+                <a:cs typeface="Verdana"/>
+              </a:rPr>
+              <a:t>Problem</a:t>
+            </a:r>
+            <a:r>
+              <a:rPr sz="1600" u="sng" spc="25" dirty="0">
+                <a:solidFill>
+                  <a:srgbClr val="EC1B2D"/>
+                </a:solidFill>
+                <a:uFill>
+                  <a:solidFill>
+                    <a:srgbClr val="EC1B2D"/>
+                  </a:solidFill>
+                </a:uFill>
+                <a:latin typeface="Verdana"/>
+                <a:cs typeface="Verdana"/>
+              </a:rPr>
+              <a:t> </a:t>
+            </a:r>
+            <a:r>
+              <a:rPr sz="1600" u="sng" spc="-10" dirty="0">
+                <a:solidFill>
+                  <a:srgbClr val="EC1B2D"/>
+                </a:solidFill>
+                <a:uFill>
+                  <a:solidFill>
+                    <a:srgbClr val="EC1B2D"/>
+                  </a:solidFill>
+                </a:uFill>
+                <a:latin typeface="Verdana"/>
+                <a:cs typeface="Verdana"/>
+              </a:rPr>
+              <a:t>Statement</a:t>
+            </a:r>
+            <a:endParaRPr sz="1600" dirty="0">
+              <a:latin typeface="Verdana"/>
+              <a:cs typeface="Verdana"/>
+            </a:endParaRPr>
+          </a:p>
+          <a:p>
+            <a:pPr marL="12700" marR="270510">
+              <a:lnSpc>
+                <a:spcPts val="1200"/>
+              </a:lnSpc>
+              <a:spcBef>
+                <a:spcPts val="605"/>
+              </a:spcBef>
+            </a:pPr>
+            <a:r>
+              <a:rPr lang="en-SG" sz="1200" spc="-5" dirty="0">
+                <a:solidFill>
+                  <a:srgbClr val="EC1B2D"/>
+                </a:solidFill>
+                <a:latin typeface="Verdana"/>
+                <a:cs typeface="Verdana"/>
+              </a:rPr>
+              <a:t>How might we help users to better navigate the health/ wellness features and resources within Pulse, for better health outcomes?</a:t>
+            </a:r>
+          </a:p>
+          <a:p>
+            <a:pPr marL="12700" marR="270510">
+              <a:lnSpc>
+                <a:spcPts val="1200"/>
+              </a:lnSpc>
+              <a:spcBef>
+                <a:spcPts val="605"/>
+              </a:spcBef>
+            </a:pPr>
+            <a:endParaRPr sz="1300" dirty="0">
+              <a:latin typeface="Verdana"/>
+              <a:cs typeface="Verdana"/>
+            </a:endParaRPr>
+          </a:p>
+          <a:p>
+            <a:pPr marL="12700" marR="5080">
+              <a:lnSpc>
+                <a:spcPct val="100000"/>
+              </a:lnSpc>
+            </a:pPr>
+            <a:r>
+              <a:rPr lang="en-SG" sz="1200" spc="-10" dirty="0">
+                <a:solidFill>
+                  <a:srgbClr val="687379"/>
+                </a:solidFill>
+                <a:latin typeface="Verdana"/>
+                <a:cs typeface="Verdana"/>
+              </a:rPr>
+              <a:t>At Prudential, we seek to help our communities stay healthy through our Pulse app that provides tools and tips on fitness, nutrition, mental wellness and more.</a:t>
+            </a:r>
+          </a:p>
+          <a:p>
+            <a:pPr marL="12700" marR="5080">
+              <a:lnSpc>
+                <a:spcPct val="100000"/>
+              </a:lnSpc>
+            </a:pPr>
+            <a:endParaRPr lang="en-SG" sz="1200" spc="-10" dirty="0">
+              <a:solidFill>
+                <a:srgbClr val="687379"/>
+              </a:solidFill>
+              <a:latin typeface="Verdana"/>
+              <a:cs typeface="Verdana"/>
+            </a:endParaRPr>
+          </a:p>
+          <a:p>
+            <a:pPr marL="12700" marR="5080">
+              <a:lnSpc>
+                <a:spcPct val="100000"/>
+              </a:lnSpc>
+            </a:pPr>
+            <a:r>
+              <a:rPr lang="en-SG" sz="1200" spc="-10" dirty="0">
+                <a:solidFill>
+                  <a:srgbClr val="687379"/>
+                </a:solidFill>
+                <a:latin typeface="Verdana"/>
+                <a:cs typeface="Verdana"/>
+              </a:rPr>
+              <a:t>Some users consider health a complex topic and often postpone positive health and wellness decisions till health issues start surfacing.  How should the health ecosystem within the Pulse app be (re)designed, or what new features can be added to Pulse, to intuitively nudge users towards a healthier lifestyle?</a:t>
+            </a:r>
+          </a:p>
+          <a:p>
+            <a:pPr marL="12700" marR="5080">
+              <a:lnSpc>
+                <a:spcPct val="100000"/>
+              </a:lnSpc>
+            </a:pPr>
+            <a:endParaRPr lang="en-SG" sz="1200" spc="-10" dirty="0">
+              <a:solidFill>
+                <a:srgbClr val="687379"/>
+              </a:solidFill>
+              <a:latin typeface="Verdana"/>
+              <a:cs typeface="Verdana"/>
+            </a:endParaRPr>
+          </a:p>
+          <a:p>
+            <a:pPr marL="12700" marR="5080">
+              <a:lnSpc>
+                <a:spcPct val="100000"/>
+              </a:lnSpc>
+            </a:pPr>
+            <a:r>
+              <a:rPr lang="en-SG" sz="1200" spc="-10" dirty="0">
+                <a:solidFill>
+                  <a:srgbClr val="687379"/>
+                </a:solidFill>
+                <a:latin typeface="Verdana"/>
+                <a:cs typeface="Verdana"/>
+              </a:rPr>
+              <a:t>You can find the Pulse by Prudential app in both the Apple and Google Play app store.</a:t>
+            </a:r>
+            <a:endParaRPr sz="1200" dirty="0">
+              <a:latin typeface="Verdana"/>
+              <a:cs typeface="Verdana"/>
+            </a:endParaRPr>
+          </a:p>
+        </p:txBody>
+      </p:sp>
+      <p:sp>
+        <p:nvSpPr>
+          <p:cNvPr id="3" name="object 3"/>
+          <p:cNvSpPr txBox="1">
+            <a:spLocks noGrp="1"/>
+          </p:cNvSpPr>
+          <p:nvPr>
+            <p:ph type="title"/>
+          </p:nvPr>
+        </p:nvSpPr>
+        <p:spPr>
+          <a:xfrm>
+            <a:off x="1778000" y="560070"/>
+            <a:ext cx="4013200" cy="382156"/>
+          </a:xfrm>
+          <a:prstGeom prst="rect">
+            <a:avLst/>
+          </a:prstGeom>
+        </p:spPr>
+        <p:txBody>
+          <a:bodyPr vert="horz" wrap="square" lIns="0" tIns="12700" rIns="0" bIns="0" rtlCol="0">
+            <a:spAutoFit/>
+          </a:bodyPr>
+          <a:lstStyle/>
+          <a:p>
+            <a:pPr marL="12700">
+              <a:lnSpc>
+                <a:spcPct val="100000"/>
+              </a:lnSpc>
+              <a:spcBef>
+                <a:spcPts val="100"/>
+              </a:spcBef>
+            </a:pPr>
+            <a:r>
+              <a:rPr lang="en-SG" spc="-5" dirty="0"/>
+              <a:t>Digital Health Application</a:t>
+            </a:r>
+            <a:endParaRPr dirty="0"/>
+          </a:p>
+        </p:txBody>
+      </p:sp>
+      <p:sp>
+        <p:nvSpPr>
+          <p:cNvPr id="5" name="object 5"/>
+          <p:cNvSpPr txBox="1">
+            <a:spLocks noGrp="1"/>
+          </p:cNvSpPr>
+          <p:nvPr>
+            <p:ph type="ftr" sz="quarter" idx="5"/>
+          </p:nvPr>
+        </p:nvSpPr>
+        <p:spPr>
+          <a:prstGeom prst="rect">
+            <a:avLst/>
+          </a:prstGeom>
+        </p:spPr>
+        <p:txBody>
+          <a:bodyPr vert="horz" wrap="square" lIns="0" tIns="12700" rIns="0" bIns="0" rtlCol="0">
+            <a:spAutoFit/>
+          </a:bodyPr>
+          <a:lstStyle/>
+          <a:p>
+            <a:pPr marL="12700">
+              <a:lnSpc>
+                <a:spcPct val="100000"/>
+              </a:lnSpc>
+              <a:spcBef>
+                <a:spcPts val="100"/>
+              </a:spcBef>
+            </a:pPr>
+            <a:r>
+              <a:rPr dirty="0"/>
+              <a:t>C</a:t>
+            </a:r>
+            <a:r>
+              <a:rPr spc="-10" dirty="0"/>
+              <a:t>o</a:t>
+            </a:r>
+            <a:r>
+              <a:rPr spc="-5" dirty="0"/>
+              <a:t>n</a:t>
+            </a:r>
+            <a:r>
+              <a:rPr spc="-10" dirty="0"/>
+              <a:t>f</a:t>
+            </a:r>
+            <a:r>
+              <a:rPr spc="-20" dirty="0"/>
+              <a:t>i</a:t>
+            </a:r>
+            <a:r>
+              <a:rPr spc="-5" dirty="0"/>
+              <a:t>dent</a:t>
+            </a:r>
+            <a:r>
+              <a:rPr spc="-15" dirty="0"/>
+              <a:t>i</a:t>
+            </a:r>
+            <a:r>
+              <a:rPr spc="-5" dirty="0"/>
+              <a:t>al</a:t>
+            </a:r>
+          </a:p>
+        </p:txBody>
+      </p:sp>
+      <p:sp>
+        <p:nvSpPr>
+          <p:cNvPr id="6" name="object 6"/>
+          <p:cNvSpPr txBox="1">
+            <a:spLocks noGrp="1"/>
+          </p:cNvSpPr>
+          <p:nvPr>
+            <p:ph type="sldNum" sz="quarter" idx="7"/>
+          </p:nvPr>
+        </p:nvSpPr>
+        <p:spPr>
+          <a:prstGeom prst="rect">
+            <a:avLst/>
+          </a:prstGeom>
+        </p:spPr>
+        <p:txBody>
+          <a:bodyPr vert="horz" wrap="square" lIns="0" tIns="12700" rIns="0" bIns="0" rtlCol="0">
+            <a:spAutoFit/>
+          </a:bodyPr>
+          <a:lstStyle/>
+          <a:p>
+            <a:pPr marL="38100">
+              <a:lnSpc>
+                <a:spcPct val="100000"/>
+              </a:lnSpc>
+              <a:spcBef>
+                <a:spcPts val="100"/>
+              </a:spcBef>
+            </a:pPr>
+            <a:r>
+              <a:rPr spc="-5" dirty="0"/>
+              <a:t>3</a:t>
+            </a:r>
+          </a:p>
+        </p:txBody>
+      </p:sp>
+      <p:pic>
+        <p:nvPicPr>
+          <p:cNvPr id="7" name="Picture 6" descr="Icon&#10;&#10;Description automatically generated">
+            <a:extLst>
+              <a:ext uri="{FF2B5EF4-FFF2-40B4-BE49-F238E27FC236}">
+                <a16:creationId xmlns:a16="http://schemas.microsoft.com/office/drawing/2014/main" id="{D9902FC0-C1B3-45E5-8E31-E26D2DCBF2A1}"/>
+              </a:ext>
+            </a:extLst>
+          </p:cNvPr>
+          <p:cNvPicPr>
+            <a:picLocks noChangeAspect="1"/>
+          </p:cNvPicPr>
+          <p:nvPr/>
+        </p:nvPicPr>
+        <p:blipFill>
+          <a:blip r:embed="rId2" cstate="print">
+            <a:extLst>
+              <a:ext uri="{28A0092B-C50C-407E-A947-70E740481C1C}">
+                <a14:useLocalDpi xmlns:a14="http://schemas.microsoft.com/office/drawing/2010/main" val="0"/>
+              </a:ext>
+            </a:extLst>
+          </a:blip>
+          <a:stretch>
+            <a:fillRect/>
+          </a:stretch>
+        </p:blipFill>
+        <p:spPr>
+          <a:xfrm>
+            <a:off x="687006" y="265474"/>
+            <a:ext cx="934676" cy="934676"/>
+          </a:xfrm>
+          <a:prstGeom prst="rect">
+            <a:avLst/>
+          </a:prstGeom>
+        </p:spPr>
+      </p:pic>
+    </p:spTree>
+    <p:extLst>
+      <p:ext uri="{BB962C8B-B14F-4D97-AF65-F5344CB8AC3E}">
+        <p14:creationId xmlns:p14="http://schemas.microsoft.com/office/powerpoint/2010/main" val="2859923408"/>
+      </p:ext>
+    </p:extLst>
+  </p:cSld>
+  <p:clrMapOvr>
+    <a:masterClrMapping/>
+  </p:clrMapOvr>
+</p:sld>
+</file>
+
+<file path=ppt/slides/slide8.xml><?xml version="1.0" encoding="utf-8"?>
+<p:sld xmlns:a="http://schemas.openxmlformats.org/drawingml/2006/main" xmlns:r="http://schemas.openxmlformats.org/officeDocument/2006/relationships" xmlns:p="http://schemas.openxmlformats.org/presentationml/2006/main">
+  <p:cSld>
+    <p:spTree>
+      <p:nvGrpSpPr>
+        <p:cNvPr id="1" name=""/>
+        <p:cNvGrpSpPr/>
+        <p:nvPr/>
+      </p:nvGrpSpPr>
+      <p:grpSpPr>
+        <a:xfrm>
+          <a:off x="0" y="0"/>
+          <a:ext cx="0" cy="0"/>
+          <a:chOff x="0" y="0"/>
+          <a:chExt cx="0" cy="0"/>
+        </a:xfrm>
+      </p:grpSpPr>
+      <p:sp>
+        <p:nvSpPr>
+          <p:cNvPr id="2" name="object 2"/>
+          <p:cNvSpPr txBox="1"/>
+          <p:nvPr/>
+        </p:nvSpPr>
+        <p:spPr>
+          <a:xfrm>
+            <a:off x="682244" y="1105003"/>
+            <a:ext cx="7615555" cy="3121367"/>
+          </a:xfrm>
+          <a:prstGeom prst="rect">
+            <a:avLst/>
+          </a:prstGeom>
+        </p:spPr>
+        <p:txBody>
+          <a:bodyPr vert="horz" wrap="square" lIns="0" tIns="73660" rIns="0" bIns="0" rtlCol="0">
+            <a:spAutoFit/>
+          </a:bodyPr>
+          <a:lstStyle/>
+          <a:p>
+            <a:pPr marL="12700">
+              <a:lnSpc>
+                <a:spcPct val="100000"/>
+              </a:lnSpc>
+              <a:spcBef>
+                <a:spcPts val="580"/>
+              </a:spcBef>
+            </a:pPr>
+            <a:r>
+              <a:rPr sz="1600" u="sng" spc="-5" dirty="0">
+                <a:solidFill>
+                  <a:srgbClr val="EC1B2D"/>
+                </a:solidFill>
+                <a:uFill>
+                  <a:solidFill>
+                    <a:srgbClr val="EC1B2D"/>
+                  </a:solidFill>
+                </a:uFill>
+                <a:latin typeface="Verdana"/>
+                <a:cs typeface="Verdana"/>
+              </a:rPr>
+              <a:t>Problem</a:t>
+            </a:r>
+            <a:r>
+              <a:rPr sz="1600" u="sng" spc="25" dirty="0">
+                <a:solidFill>
+                  <a:srgbClr val="EC1B2D"/>
+                </a:solidFill>
+                <a:uFill>
+                  <a:solidFill>
+                    <a:srgbClr val="EC1B2D"/>
+                  </a:solidFill>
+                </a:uFill>
+                <a:latin typeface="Verdana"/>
+                <a:cs typeface="Verdana"/>
+              </a:rPr>
+              <a:t> </a:t>
+            </a:r>
+            <a:r>
+              <a:rPr sz="1600" u="sng" spc="-10" dirty="0">
+                <a:solidFill>
+                  <a:srgbClr val="EC1B2D"/>
+                </a:solidFill>
+                <a:uFill>
+                  <a:solidFill>
+                    <a:srgbClr val="EC1B2D"/>
+                  </a:solidFill>
+                </a:uFill>
+                <a:latin typeface="Verdana"/>
+                <a:cs typeface="Verdana"/>
+              </a:rPr>
+              <a:t>Statement</a:t>
+            </a:r>
+            <a:endParaRPr sz="1600" dirty="0">
+              <a:latin typeface="Verdana"/>
+              <a:cs typeface="Verdana"/>
+            </a:endParaRPr>
+          </a:p>
+          <a:p>
+            <a:pPr marL="12700" marR="270510">
+              <a:lnSpc>
+                <a:spcPts val="1200"/>
+              </a:lnSpc>
+              <a:spcBef>
+                <a:spcPts val="605"/>
+              </a:spcBef>
+            </a:pPr>
+            <a:r>
+              <a:rPr lang="en-SG" sz="1200" spc="-5" dirty="0">
+                <a:solidFill>
+                  <a:srgbClr val="EC1B2D"/>
+                </a:solidFill>
+                <a:latin typeface="Verdana"/>
+                <a:cs typeface="Verdana"/>
+              </a:rPr>
+              <a:t>How might we encourage Pulse users to provide relevant health data which we can then use to generate insights for them and nudge them, through the Pulse app, towards a healthier lifestyle?</a:t>
+            </a:r>
+          </a:p>
+          <a:p>
+            <a:pPr marL="12700" marR="270510">
+              <a:lnSpc>
+                <a:spcPts val="1200"/>
+              </a:lnSpc>
+              <a:spcBef>
+                <a:spcPts val="605"/>
+              </a:spcBef>
+            </a:pPr>
+            <a:endParaRPr sz="1300" dirty="0">
+              <a:latin typeface="Verdana"/>
+              <a:cs typeface="Verdana"/>
+            </a:endParaRPr>
+          </a:p>
+          <a:p>
+            <a:pPr marL="12700" marR="5080">
+              <a:lnSpc>
+                <a:spcPct val="100000"/>
+              </a:lnSpc>
+            </a:pPr>
+            <a:r>
+              <a:rPr lang="en-SG" sz="1200" spc="-10" dirty="0">
+                <a:solidFill>
+                  <a:srgbClr val="687379"/>
+                </a:solidFill>
+                <a:latin typeface="Verdana"/>
+                <a:cs typeface="Verdana"/>
+              </a:rPr>
+              <a:t>Fundamental health metrics like weight, height, BMI, body fat, </a:t>
+            </a:r>
+            <a:r>
+              <a:rPr lang="en-SG" sz="1200" spc="-10" dirty="0" err="1">
+                <a:solidFill>
+                  <a:srgbClr val="687379"/>
+                </a:solidFill>
+                <a:latin typeface="Verdana"/>
+                <a:cs typeface="Verdana"/>
+              </a:rPr>
+              <a:t>cholestrol</a:t>
+            </a:r>
+            <a:r>
+              <a:rPr lang="en-SG" sz="1200" spc="-10" dirty="0">
+                <a:solidFill>
+                  <a:srgbClr val="687379"/>
+                </a:solidFill>
+                <a:latin typeface="Verdana"/>
+                <a:cs typeface="Verdana"/>
+              </a:rPr>
+              <a:t> level and the like would be most useful, followed by lifestyle indicators such as diet, how often do they exercise, duration and quality of sleep, steps walked, etc. </a:t>
+            </a:r>
+          </a:p>
+          <a:p>
+            <a:pPr marL="12700" marR="5080">
+              <a:lnSpc>
+                <a:spcPct val="100000"/>
+              </a:lnSpc>
+            </a:pPr>
+            <a:endParaRPr lang="en-SG" sz="1200" spc="-10" dirty="0">
+              <a:solidFill>
+                <a:srgbClr val="687379"/>
+              </a:solidFill>
+              <a:latin typeface="Verdana"/>
+              <a:cs typeface="Verdana"/>
+            </a:endParaRPr>
+          </a:p>
+          <a:p>
+            <a:pPr marL="12700" marR="5080">
+              <a:lnSpc>
+                <a:spcPct val="100000"/>
+              </a:lnSpc>
+            </a:pPr>
+            <a:r>
+              <a:rPr lang="en-SG" sz="1200" spc="-10" dirty="0">
+                <a:solidFill>
+                  <a:srgbClr val="687379"/>
+                </a:solidFill>
+                <a:latin typeface="Verdana"/>
+                <a:cs typeface="Verdana"/>
+              </a:rPr>
+              <a:t>If wearables are used in the proposed solution, please ensure that these are reasonably accessible and cost effective.  Integrity of data collected is important (</a:t>
+            </a:r>
+            <a:r>
+              <a:rPr lang="en-SG" sz="1200" spc="-10" dirty="0" err="1">
+                <a:solidFill>
+                  <a:srgbClr val="687379"/>
+                </a:solidFill>
+                <a:latin typeface="Verdana"/>
+                <a:cs typeface="Verdana"/>
+              </a:rPr>
+              <a:t>eg.</a:t>
+            </a:r>
+            <a:r>
+              <a:rPr lang="en-SG" sz="1200" spc="-10" dirty="0">
+                <a:solidFill>
+                  <a:srgbClr val="687379"/>
+                </a:solidFill>
+                <a:latin typeface="Verdana"/>
+                <a:cs typeface="Verdana"/>
+              </a:rPr>
+              <a:t> inputs coming directly from a weighing scale would be considered more reliable than weight input by a user). The user journey needs to be smooth, and the best solutions will also be able to get user updates frequently/ regularly.  </a:t>
+            </a:r>
+          </a:p>
+          <a:p>
+            <a:pPr marL="12700" marR="5080">
+              <a:lnSpc>
+                <a:spcPct val="100000"/>
+              </a:lnSpc>
+            </a:pPr>
+            <a:endParaRPr lang="en-SG" sz="1200" spc="-10" dirty="0">
+              <a:solidFill>
+                <a:srgbClr val="687379"/>
+              </a:solidFill>
+              <a:latin typeface="Verdana"/>
+              <a:cs typeface="Verdana"/>
+            </a:endParaRPr>
+          </a:p>
+          <a:p>
+            <a:pPr marL="12700" marR="5080">
+              <a:lnSpc>
+                <a:spcPct val="100000"/>
+              </a:lnSpc>
+            </a:pPr>
+            <a:r>
+              <a:rPr lang="en-SG" sz="1200" spc="-10" dirty="0">
+                <a:solidFill>
+                  <a:srgbClr val="687379"/>
+                </a:solidFill>
+                <a:latin typeface="Verdana"/>
+                <a:cs typeface="Verdana"/>
+              </a:rPr>
+              <a:t>You can find the Pulse by Prudential app in both the Apple and Google Play app store.</a:t>
+            </a:r>
+            <a:endParaRPr sz="1200" dirty="0">
+              <a:latin typeface="Verdana"/>
+              <a:cs typeface="Verdana"/>
+            </a:endParaRPr>
+          </a:p>
+        </p:txBody>
+      </p:sp>
+      <p:sp>
+        <p:nvSpPr>
+          <p:cNvPr id="3" name="object 3"/>
+          <p:cNvSpPr txBox="1">
+            <a:spLocks noGrp="1"/>
+          </p:cNvSpPr>
+          <p:nvPr>
+            <p:ph type="title"/>
+          </p:nvPr>
+        </p:nvSpPr>
+        <p:spPr>
+          <a:xfrm>
+            <a:off x="1778000" y="560070"/>
+            <a:ext cx="1879600" cy="382156"/>
+          </a:xfrm>
+          <a:prstGeom prst="rect">
+            <a:avLst/>
+          </a:prstGeom>
+        </p:spPr>
+        <p:txBody>
+          <a:bodyPr vert="horz" wrap="square" lIns="0" tIns="12700" rIns="0" bIns="0" rtlCol="0">
+            <a:spAutoFit/>
+          </a:bodyPr>
+          <a:lstStyle/>
+          <a:p>
+            <a:pPr marL="12700">
+              <a:lnSpc>
+                <a:spcPct val="100000"/>
+              </a:lnSpc>
+              <a:spcBef>
+                <a:spcPts val="100"/>
+              </a:spcBef>
+            </a:pPr>
+            <a:r>
+              <a:rPr lang="en-SG" spc="-5" dirty="0" err="1"/>
+              <a:t>HealthTech</a:t>
+            </a:r>
+            <a:endParaRPr dirty="0"/>
+          </a:p>
+        </p:txBody>
+      </p:sp>
+      <p:sp>
+        <p:nvSpPr>
+          <p:cNvPr id="5" name="object 5"/>
+          <p:cNvSpPr txBox="1">
+            <a:spLocks noGrp="1"/>
+          </p:cNvSpPr>
+          <p:nvPr>
+            <p:ph type="ftr" sz="quarter" idx="5"/>
+          </p:nvPr>
+        </p:nvSpPr>
+        <p:spPr>
+          <a:prstGeom prst="rect">
+            <a:avLst/>
+          </a:prstGeom>
+        </p:spPr>
+        <p:txBody>
+          <a:bodyPr vert="horz" wrap="square" lIns="0" tIns="12700" rIns="0" bIns="0" rtlCol="0">
+            <a:spAutoFit/>
+          </a:bodyPr>
+          <a:lstStyle/>
+          <a:p>
+            <a:pPr marL="12700">
+              <a:lnSpc>
+                <a:spcPct val="100000"/>
+              </a:lnSpc>
+              <a:spcBef>
+                <a:spcPts val="100"/>
+              </a:spcBef>
+            </a:pPr>
+            <a:r>
+              <a:rPr dirty="0"/>
+              <a:t>C</a:t>
+            </a:r>
+            <a:r>
+              <a:rPr spc="-10" dirty="0"/>
+              <a:t>o</a:t>
+            </a:r>
+            <a:r>
+              <a:rPr spc="-5" dirty="0"/>
+              <a:t>n</a:t>
+            </a:r>
+            <a:r>
+              <a:rPr spc="-10" dirty="0"/>
+              <a:t>f</a:t>
+            </a:r>
+            <a:r>
+              <a:rPr spc="-20" dirty="0"/>
+              <a:t>i</a:t>
+            </a:r>
+            <a:r>
+              <a:rPr spc="-5" dirty="0"/>
+              <a:t>dent</a:t>
+            </a:r>
+            <a:r>
+              <a:rPr spc="-15" dirty="0"/>
+              <a:t>i</a:t>
+            </a:r>
+            <a:r>
+              <a:rPr spc="-5" dirty="0"/>
+              <a:t>al</a:t>
+            </a:r>
+          </a:p>
+        </p:txBody>
+      </p:sp>
+      <p:sp>
+        <p:nvSpPr>
+          <p:cNvPr id="6" name="object 6"/>
+          <p:cNvSpPr txBox="1">
+            <a:spLocks noGrp="1"/>
+          </p:cNvSpPr>
+          <p:nvPr>
+            <p:ph type="sldNum" sz="quarter" idx="7"/>
+          </p:nvPr>
+        </p:nvSpPr>
+        <p:spPr>
+          <a:prstGeom prst="rect">
+            <a:avLst/>
+          </a:prstGeom>
+        </p:spPr>
+        <p:txBody>
+          <a:bodyPr vert="horz" wrap="square" lIns="0" tIns="12700" rIns="0" bIns="0" rtlCol="0">
+            <a:spAutoFit/>
+          </a:bodyPr>
+          <a:lstStyle/>
+          <a:p>
+            <a:pPr marL="38100">
+              <a:lnSpc>
+                <a:spcPct val="100000"/>
+              </a:lnSpc>
+              <a:spcBef>
+                <a:spcPts val="100"/>
+              </a:spcBef>
+            </a:pPr>
+            <a:r>
+              <a:rPr spc="-5" dirty="0"/>
+              <a:t>3</a:t>
+            </a:r>
+          </a:p>
+        </p:txBody>
+      </p:sp>
+      <p:pic>
+        <p:nvPicPr>
+          <p:cNvPr id="7" name="Picture 6" descr="Icon&#10;&#10;Description automatically generated">
+            <a:extLst>
+              <a:ext uri="{FF2B5EF4-FFF2-40B4-BE49-F238E27FC236}">
+                <a16:creationId xmlns:a16="http://schemas.microsoft.com/office/drawing/2014/main" id="{983CEC89-A432-4997-9B6E-4A393D9ADE49}"/>
+              </a:ext>
+            </a:extLst>
+          </p:cNvPr>
+          <p:cNvPicPr>
+            <a:picLocks noChangeAspect="1"/>
+          </p:cNvPicPr>
+          <p:nvPr/>
+        </p:nvPicPr>
+        <p:blipFill>
+          <a:blip r:embed="rId2" cstate="print">
+            <a:extLst>
+              <a:ext uri="{28A0092B-C50C-407E-A947-70E740481C1C}">
+                <a14:useLocalDpi xmlns:a14="http://schemas.microsoft.com/office/drawing/2010/main" val="0"/>
+              </a:ext>
+            </a:extLst>
+          </a:blip>
+          <a:stretch>
+            <a:fillRect/>
+          </a:stretch>
+        </p:blipFill>
+        <p:spPr>
+          <a:xfrm>
+            <a:off x="687006" y="265474"/>
+            <a:ext cx="934676" cy="934676"/>
+          </a:xfrm>
+          <a:prstGeom prst="rect">
+            <a:avLst/>
+          </a:prstGeom>
+        </p:spPr>
+      </p:pic>
+    </p:spTree>
+    <p:extLst>
+      <p:ext uri="{BB962C8B-B14F-4D97-AF65-F5344CB8AC3E}">
+        <p14:creationId xmlns:p14="http://schemas.microsoft.com/office/powerpoint/2010/main" val="3418567860"/>
+      </p:ext>
+    </p:extLst>
+  </p:cSld>
+  <p:clrMapOvr>
+    <a:masterClrMapping/>
+  </p:clrMapOvr>
+</p:sld>
+</file>
+
+<file path=ppt/slides/slide9.xml><?xml version="1.0" encoding="utf-8"?>
+<p:sld xmlns:a="http://schemas.openxmlformats.org/drawingml/2006/main" xmlns:r="http://schemas.openxmlformats.org/officeDocument/2006/relationships" xmlns:p="http://schemas.openxmlformats.org/presentationml/2006/main">
+  <p:cSld>
+    <p:spTree>
+      <p:nvGrpSpPr>
+        <p:cNvPr id="1" name=""/>
+        <p:cNvGrpSpPr/>
+        <p:nvPr/>
+      </p:nvGrpSpPr>
+      <p:grpSpPr>
+        <a:xfrm>
+          <a:off x="0" y="0"/>
+          <a:ext cx="0" cy="0"/>
+          <a:chOff x="0" y="0"/>
+          <a:chExt cx="0" cy="0"/>
+        </a:xfrm>
+      </p:grpSpPr>
+      <p:sp>
+        <p:nvSpPr>
+          <p:cNvPr id="2" name="object 2"/>
+          <p:cNvSpPr txBox="1"/>
+          <p:nvPr/>
+        </p:nvSpPr>
+        <p:spPr>
+          <a:xfrm>
+            <a:off x="682244" y="1105003"/>
+            <a:ext cx="7615555" cy="3306033"/>
+          </a:xfrm>
+          <a:prstGeom prst="rect">
+            <a:avLst/>
+          </a:prstGeom>
+        </p:spPr>
+        <p:txBody>
+          <a:bodyPr vert="horz" wrap="square" lIns="0" tIns="73660" rIns="0" bIns="0" rtlCol="0">
+            <a:spAutoFit/>
+          </a:bodyPr>
+          <a:lstStyle/>
+          <a:p>
+            <a:pPr marL="12700">
+              <a:lnSpc>
+                <a:spcPct val="100000"/>
+              </a:lnSpc>
+              <a:spcBef>
+                <a:spcPts val="580"/>
+              </a:spcBef>
+            </a:pPr>
+            <a:r>
+              <a:rPr sz="1600" u="sng" spc="-5" dirty="0">
+                <a:solidFill>
+                  <a:srgbClr val="EC1B2D"/>
+                </a:solidFill>
+                <a:uFill>
+                  <a:solidFill>
+                    <a:srgbClr val="EC1B2D"/>
+                  </a:solidFill>
+                </a:uFill>
+                <a:latin typeface="Verdana"/>
+                <a:cs typeface="Verdana"/>
+              </a:rPr>
+              <a:t>Problem</a:t>
+            </a:r>
+            <a:r>
+              <a:rPr sz="1600" u="sng" spc="25" dirty="0">
+                <a:solidFill>
+                  <a:srgbClr val="EC1B2D"/>
+                </a:solidFill>
+                <a:uFill>
+                  <a:solidFill>
+                    <a:srgbClr val="EC1B2D"/>
+                  </a:solidFill>
+                </a:uFill>
+                <a:latin typeface="Verdana"/>
+                <a:cs typeface="Verdana"/>
+              </a:rPr>
+              <a:t> </a:t>
+            </a:r>
+            <a:r>
+              <a:rPr sz="1600" u="sng" spc="-10" dirty="0">
+                <a:solidFill>
+                  <a:srgbClr val="EC1B2D"/>
+                </a:solidFill>
+                <a:uFill>
+                  <a:solidFill>
+                    <a:srgbClr val="EC1B2D"/>
+                  </a:solidFill>
+                </a:uFill>
+                <a:latin typeface="Verdana"/>
+                <a:cs typeface="Verdana"/>
+              </a:rPr>
+              <a:t>Statement</a:t>
+            </a:r>
+            <a:endParaRPr sz="1600" dirty="0">
+              <a:latin typeface="Verdana"/>
+              <a:cs typeface="Verdana"/>
+            </a:endParaRPr>
+          </a:p>
+          <a:p>
+            <a:pPr marL="12700" marR="270510">
+              <a:lnSpc>
+                <a:spcPts val="1200"/>
+              </a:lnSpc>
+              <a:spcBef>
+                <a:spcPts val="605"/>
+              </a:spcBef>
+            </a:pPr>
+            <a:r>
+              <a:rPr lang="en-SG" sz="1200" spc="-5" dirty="0">
+                <a:solidFill>
+                  <a:srgbClr val="EC1B2D"/>
+                </a:solidFill>
+                <a:latin typeface="Verdana"/>
+                <a:cs typeface="Verdana"/>
+              </a:rPr>
+              <a:t>How might we create so much value for our customers that they will gladly subscribe to a paid plan that will help them improve their health or wealth outcomes and/or invite their family, friends, and community to actively participate on Pulse?</a:t>
+            </a:r>
+          </a:p>
+          <a:p>
+            <a:pPr marL="12700" marR="270510">
+              <a:lnSpc>
+                <a:spcPts val="1200"/>
+              </a:lnSpc>
+              <a:spcBef>
+                <a:spcPts val="605"/>
+              </a:spcBef>
+            </a:pPr>
+            <a:endParaRPr sz="1300" dirty="0">
+              <a:latin typeface="Verdana"/>
+              <a:cs typeface="Verdana"/>
+            </a:endParaRPr>
+          </a:p>
+          <a:p>
+            <a:pPr marL="12700" marR="5080">
+              <a:lnSpc>
+                <a:spcPct val="100000"/>
+              </a:lnSpc>
+            </a:pPr>
+            <a:r>
+              <a:rPr lang="en-SG" sz="1200" spc="-10" dirty="0">
+                <a:solidFill>
+                  <a:srgbClr val="687379"/>
+                </a:solidFill>
+                <a:latin typeface="Verdana"/>
+                <a:cs typeface="Verdana"/>
+              </a:rPr>
+              <a:t>At Prudential, our purpose is to help everyone (even people who are not yet our customers) get the most out of life.</a:t>
+            </a:r>
+          </a:p>
+          <a:p>
+            <a:pPr marL="12700" marR="5080">
+              <a:lnSpc>
+                <a:spcPct val="100000"/>
+              </a:lnSpc>
+            </a:pPr>
+            <a:endParaRPr lang="en-SG" sz="1200" spc="-10" dirty="0">
+              <a:solidFill>
+                <a:srgbClr val="687379"/>
+              </a:solidFill>
+              <a:latin typeface="Verdana"/>
+              <a:cs typeface="Verdana"/>
+            </a:endParaRPr>
+          </a:p>
+          <a:p>
+            <a:pPr marL="12700" marR="5080">
+              <a:lnSpc>
+                <a:spcPct val="100000"/>
+              </a:lnSpc>
+            </a:pPr>
+            <a:r>
+              <a:rPr lang="en-SG" sz="1200" spc="-10" dirty="0">
+                <a:solidFill>
+                  <a:srgbClr val="687379"/>
+                </a:solidFill>
+                <a:latin typeface="Verdana"/>
+                <a:cs typeface="Verdana"/>
+              </a:rPr>
+              <a:t>What new feature can we build or what new partner can we collaborate with that helps our community of users, especially Gen Z or Millennial users, to regularly interact with Pulse and to encourage their friends to do so as well?</a:t>
+            </a:r>
+          </a:p>
+          <a:p>
+            <a:pPr marL="12700" marR="5080">
+              <a:lnSpc>
+                <a:spcPct val="100000"/>
+              </a:lnSpc>
+            </a:pPr>
+            <a:endParaRPr lang="en-SG" sz="1200" spc="-10" dirty="0">
+              <a:solidFill>
+                <a:srgbClr val="687379"/>
+              </a:solidFill>
+              <a:latin typeface="Verdana"/>
+              <a:cs typeface="Verdana"/>
+            </a:endParaRPr>
+          </a:p>
+          <a:p>
+            <a:pPr marL="12700" marR="5080">
+              <a:lnSpc>
+                <a:spcPct val="100000"/>
+              </a:lnSpc>
+            </a:pPr>
+            <a:r>
+              <a:rPr lang="en-SG" sz="1200" spc="-10" dirty="0">
+                <a:solidFill>
+                  <a:srgbClr val="687379"/>
+                </a:solidFill>
+                <a:latin typeface="Verdana"/>
+                <a:cs typeface="Verdana"/>
+              </a:rPr>
+              <a:t>The subscription could cost as low as $1 or be anything that the users would be happy to pay for. </a:t>
+            </a:r>
+          </a:p>
+          <a:p>
+            <a:pPr marL="12700" marR="5080">
+              <a:lnSpc>
+                <a:spcPct val="100000"/>
+              </a:lnSpc>
+            </a:pPr>
+            <a:endParaRPr lang="en-SG" sz="1200" spc="-10" dirty="0">
+              <a:solidFill>
+                <a:srgbClr val="687379"/>
+              </a:solidFill>
+              <a:latin typeface="Verdana"/>
+              <a:cs typeface="Verdana"/>
+            </a:endParaRPr>
+          </a:p>
+          <a:p>
+            <a:pPr marL="12700" marR="5080">
+              <a:lnSpc>
+                <a:spcPct val="100000"/>
+              </a:lnSpc>
+            </a:pPr>
+            <a:r>
+              <a:rPr lang="en-SG" sz="1200" spc="-10" dirty="0">
+                <a:solidFill>
+                  <a:srgbClr val="687379"/>
+                </a:solidFill>
+                <a:latin typeface="Verdana"/>
+                <a:cs typeface="Verdana"/>
+              </a:rPr>
+              <a:t>An ideal solution will also leverage AI to make recommendations or deliver behavioural nudges for better health and/or wealth outcomes, and also have elements that encourage a viral network effect.</a:t>
+            </a:r>
+            <a:endParaRPr sz="1200" dirty="0">
+              <a:latin typeface="Verdana"/>
+              <a:cs typeface="Verdana"/>
+            </a:endParaRPr>
+          </a:p>
+        </p:txBody>
+      </p:sp>
+      <p:sp>
+        <p:nvSpPr>
+          <p:cNvPr id="3" name="object 3"/>
+          <p:cNvSpPr txBox="1">
+            <a:spLocks noGrp="1"/>
+          </p:cNvSpPr>
+          <p:nvPr>
+            <p:ph type="title"/>
+          </p:nvPr>
+        </p:nvSpPr>
+        <p:spPr>
+          <a:xfrm>
+            <a:off x="1778000" y="560070"/>
+            <a:ext cx="5613400" cy="382156"/>
+          </a:xfrm>
+          <a:prstGeom prst="rect">
+            <a:avLst/>
+          </a:prstGeom>
+        </p:spPr>
+        <p:txBody>
+          <a:bodyPr vert="horz" wrap="square" lIns="0" tIns="12700" rIns="0" bIns="0" rtlCol="0">
+            <a:spAutoFit/>
+          </a:bodyPr>
+          <a:lstStyle/>
+          <a:p>
+            <a:pPr marL="12700">
+              <a:lnSpc>
+                <a:spcPct val="100000"/>
+              </a:lnSpc>
+              <a:spcBef>
+                <a:spcPts val="100"/>
+              </a:spcBef>
+            </a:pPr>
+            <a:r>
+              <a:rPr lang="en-SG" spc="-5" dirty="0"/>
+              <a:t>Digital Health &amp; Wealth Application</a:t>
+            </a:r>
+            <a:endParaRPr dirty="0"/>
+          </a:p>
+        </p:txBody>
+      </p:sp>
+      <p:sp>
+        <p:nvSpPr>
+          <p:cNvPr id="5" name="object 5"/>
+          <p:cNvSpPr txBox="1">
+            <a:spLocks noGrp="1"/>
+          </p:cNvSpPr>
+          <p:nvPr>
+            <p:ph type="ftr" sz="quarter" idx="5"/>
+          </p:nvPr>
+        </p:nvSpPr>
+        <p:spPr>
+          <a:prstGeom prst="rect">
+            <a:avLst/>
+          </a:prstGeom>
+        </p:spPr>
+        <p:txBody>
+          <a:bodyPr vert="horz" wrap="square" lIns="0" tIns="12700" rIns="0" bIns="0" rtlCol="0">
+            <a:spAutoFit/>
+          </a:bodyPr>
+          <a:lstStyle/>
+          <a:p>
+            <a:pPr marL="12700">
+              <a:lnSpc>
+                <a:spcPct val="100000"/>
+              </a:lnSpc>
+              <a:spcBef>
+                <a:spcPts val="100"/>
+              </a:spcBef>
+            </a:pPr>
+            <a:r>
+              <a:rPr dirty="0"/>
+              <a:t>C</a:t>
+            </a:r>
+            <a:r>
+              <a:rPr spc="-10" dirty="0"/>
+              <a:t>o</a:t>
+            </a:r>
+            <a:r>
+              <a:rPr spc="-5" dirty="0"/>
+              <a:t>n</a:t>
+            </a:r>
+            <a:r>
+              <a:rPr spc="-10" dirty="0"/>
+              <a:t>f</a:t>
+            </a:r>
+            <a:r>
+              <a:rPr spc="-20" dirty="0"/>
+              <a:t>i</a:t>
+            </a:r>
+            <a:r>
+              <a:rPr spc="-5" dirty="0"/>
+              <a:t>dent</a:t>
+            </a:r>
+            <a:r>
+              <a:rPr spc="-15" dirty="0"/>
+              <a:t>i</a:t>
+            </a:r>
+            <a:r>
+              <a:rPr spc="-5" dirty="0"/>
+              <a:t>al</a:t>
+            </a:r>
+          </a:p>
+        </p:txBody>
+      </p:sp>
+      <p:sp>
+        <p:nvSpPr>
+          <p:cNvPr id="6" name="object 6"/>
+          <p:cNvSpPr txBox="1">
+            <a:spLocks noGrp="1"/>
+          </p:cNvSpPr>
+          <p:nvPr>
+            <p:ph type="sldNum" sz="quarter" idx="7"/>
+          </p:nvPr>
+        </p:nvSpPr>
+        <p:spPr>
+          <a:prstGeom prst="rect">
+            <a:avLst/>
+          </a:prstGeom>
+        </p:spPr>
+        <p:txBody>
+          <a:bodyPr vert="horz" wrap="square" lIns="0" tIns="12700" rIns="0" bIns="0" rtlCol="0">
+            <a:spAutoFit/>
+          </a:bodyPr>
+          <a:lstStyle/>
+          <a:p>
+            <a:pPr marL="38100">
+              <a:lnSpc>
+                <a:spcPct val="100000"/>
+              </a:lnSpc>
+              <a:spcBef>
+                <a:spcPts val="100"/>
+              </a:spcBef>
+            </a:pPr>
+            <a:r>
+              <a:rPr spc="-5" dirty="0"/>
+              <a:t>3</a:t>
+            </a:r>
+          </a:p>
+        </p:txBody>
+      </p:sp>
+      <p:pic>
+        <p:nvPicPr>
+          <p:cNvPr id="7" name="Picture 6" descr="Icon&#10;&#10;Description automatically generated">
+            <a:extLst>
+              <a:ext uri="{FF2B5EF4-FFF2-40B4-BE49-F238E27FC236}">
+                <a16:creationId xmlns:a16="http://schemas.microsoft.com/office/drawing/2014/main" id="{F860A371-9038-4CE4-8F47-6FB0C0286353}"/>
+              </a:ext>
+            </a:extLst>
+          </p:cNvPr>
+          <p:cNvPicPr>
+            <a:picLocks noChangeAspect="1"/>
+          </p:cNvPicPr>
+          <p:nvPr/>
+        </p:nvPicPr>
+        <p:blipFill>
+          <a:blip r:embed="rId2" cstate="print">
+            <a:extLst>
+              <a:ext uri="{28A0092B-C50C-407E-A947-70E740481C1C}">
+                <a14:useLocalDpi xmlns:a14="http://schemas.microsoft.com/office/drawing/2010/main" val="0"/>
+              </a:ext>
+            </a:extLst>
+          </a:blip>
+          <a:stretch>
+            <a:fillRect/>
+          </a:stretch>
+        </p:blipFill>
+        <p:spPr>
+          <a:xfrm>
+            <a:off x="687006" y="265474"/>
+            <a:ext cx="934676" cy="934676"/>
+          </a:xfrm>
+          <a:prstGeom prst="rect">
+            <a:avLst/>
+          </a:prstGeom>
+        </p:spPr>
+      </p:pic>
+    </p:spTree>
+    <p:extLst>
+      <p:ext uri="{BB962C8B-B14F-4D97-AF65-F5344CB8AC3E}">
+        <p14:creationId xmlns:p14="http://schemas.microsoft.com/office/powerpoint/2010/main" val="3336408075"/>
       </p:ext>
     </p:extLst>
   </p:cSld>

</xml_diff>